<commit_message>
added 3d in text
</commit_message>
<xml_diff>
--- a/media/3d_gui_basics.pptx
+++ b/media/3d_gui_basics.pptx
@@ -107,7 +107,7 @@
   </p:defaultTextStyle>
   <p:extLst>
     <p:ext uri="{EFAFB233-063F-42B5-8137-9DF3F51BA10A}">
-      <p15:sldGuideLst xmlns="" xmlns:p15="http://schemas.microsoft.com/office/powerpoint/2012/main"/>
+      <p15:sldGuideLst xmlns:p15="http://schemas.microsoft.com/office/powerpoint/2012/main" xmlns=""/>
     </p:ext>
   </p:extLst>
 </p:presentation>
@@ -2979,7 +2979,7 @@
           <p:cNvPr id="11" name="Rectangle 10">
             <a:extLst>
               <a:ext uri="{FF2B5EF4-FFF2-40B4-BE49-F238E27FC236}">
-                <a16:creationId xmlns="" xmlns:a16="http://schemas.microsoft.com/office/drawing/2014/main" id="{EEDE0868-CF1D-4890-AC3C-6582F292F01D}"/>
+                <a16:creationId xmlns:a16="http://schemas.microsoft.com/office/drawing/2014/main" xmlns="" id="{EEDE0868-CF1D-4890-AC3C-6582F292F01D}"/>
               </a:ext>
             </a:extLst>
           </p:cNvPr>
@@ -2988,8 +2988,8 @@
         </p:nvSpPr>
         <p:spPr>
           <a:xfrm>
-            <a:off x="5307948" y="1857458"/>
-            <a:ext cx="2112135" cy="527786"/>
+            <a:off x="5086173" y="1857458"/>
+            <a:ext cx="2555684" cy="527786"/>
           </a:xfrm>
           <a:prstGeom prst="rect">
             <a:avLst/>
@@ -3046,7 +3046,15 @@
                   <a:schemeClr val="bg1"/>
                 </a:solidFill>
               </a:rPr>
-              <a:t>mouse hover</a:t>
+              <a:t>3d mouse </a:t>
+            </a:r>
+            <a:r>
+              <a:rPr lang="en-US" dirty="0" smtClean="0">
+                <a:solidFill>
+                  <a:schemeClr val="bg1"/>
+                </a:solidFill>
+              </a:rPr>
+              <a:t>hover</a:t>
             </a:r>
             <a:endParaRPr lang="en-US" dirty="0">
               <a:solidFill>
@@ -3061,7 +3069,7 @@
           <p:cNvPr id="13" name="Rectangle 10">
             <a:extLst>
               <a:ext uri="{FF2B5EF4-FFF2-40B4-BE49-F238E27FC236}">
-                <a16:creationId xmlns="" xmlns:a16="http://schemas.microsoft.com/office/drawing/2014/main" id="{EEDE0868-CF1D-4890-AC3C-6582F292F01D}"/>
+                <a16:creationId xmlns:a16="http://schemas.microsoft.com/office/drawing/2014/main" xmlns="" id="{EEDE0868-CF1D-4890-AC3C-6582F292F01D}"/>
               </a:ext>
             </a:extLst>
           </p:cNvPr>
@@ -3070,8 +3078,8 @@
         </p:nvSpPr>
         <p:spPr>
           <a:xfrm>
-            <a:off x="8380560" y="1857458"/>
-            <a:ext cx="2112135" cy="527786"/>
+            <a:off x="8158785" y="1857458"/>
+            <a:ext cx="2555684" cy="527786"/>
           </a:xfrm>
           <a:prstGeom prst="rect">
             <a:avLst/>
@@ -3128,7 +3136,15 @@
                   <a:schemeClr val="bg1"/>
                 </a:solidFill>
               </a:rPr>
-              <a:t>mouse touch click</a:t>
+              <a:t>3d mouse </a:t>
+            </a:r>
+            <a:r>
+              <a:rPr lang="en-US" dirty="0" smtClean="0">
+                <a:solidFill>
+                  <a:schemeClr val="bg1"/>
+                </a:solidFill>
+              </a:rPr>
+              <a:t>touch click</a:t>
             </a:r>
             <a:endParaRPr lang="en-US" dirty="0">
               <a:solidFill>
@@ -3143,7 +3159,7 @@
           <p:cNvPr id="17" name="Rectangle 10">
             <a:extLst>
               <a:ext uri="{FF2B5EF4-FFF2-40B4-BE49-F238E27FC236}">
-                <a16:creationId xmlns="" xmlns:a16="http://schemas.microsoft.com/office/drawing/2014/main" id="{EEDE0868-CF1D-4890-AC3C-6582F292F01D}"/>
+                <a16:creationId xmlns:a16="http://schemas.microsoft.com/office/drawing/2014/main" xmlns="" id="{EEDE0868-CF1D-4890-AC3C-6582F292F01D}"/>
               </a:ext>
             </a:extLst>
           </p:cNvPr>
@@ -3152,8 +3168,8 @@
         </p:nvSpPr>
         <p:spPr>
           <a:xfrm>
-            <a:off x="11972064" y="1857458"/>
-            <a:ext cx="2112135" cy="527786"/>
+            <a:off x="11750289" y="1857458"/>
+            <a:ext cx="2555684" cy="527786"/>
           </a:xfrm>
           <a:prstGeom prst="rect">
             <a:avLst/>
@@ -3210,7 +3226,15 @@
                   <a:schemeClr val="bg1"/>
                 </a:solidFill>
               </a:rPr>
-              <a:t>mouse touch hold</a:t>
+              <a:t>3d mouse </a:t>
+            </a:r>
+            <a:r>
+              <a:rPr lang="en-US" dirty="0" smtClean="0">
+                <a:solidFill>
+                  <a:schemeClr val="bg1"/>
+                </a:solidFill>
+              </a:rPr>
+              <a:t>touch hold</a:t>
             </a:r>
             <a:endParaRPr lang="en-US" dirty="0">
               <a:solidFill>
@@ -3225,7 +3249,7 @@
           <p:cNvPr id="18" name="Oval 19">
             <a:extLst>
               <a:ext uri="{FF2B5EF4-FFF2-40B4-BE49-F238E27FC236}">
-                <a16:creationId xmlns="" xmlns:a16="http://schemas.microsoft.com/office/drawing/2014/main" id="{1074244C-1DD6-4F23-BD1E-49DB0CB034EE}"/>
+                <a16:creationId xmlns:a16="http://schemas.microsoft.com/office/drawing/2014/main" xmlns="" id="{1074244C-1DD6-4F23-BD1E-49DB0CB034EE}"/>
               </a:ext>
             </a:extLst>
           </p:cNvPr>
@@ -3307,7 +3331,7 @@
           <p:cNvPr id="19" name="Rectangle 10">
             <a:extLst>
               <a:ext uri="{FF2B5EF4-FFF2-40B4-BE49-F238E27FC236}">
-                <a16:creationId xmlns="" xmlns:a16="http://schemas.microsoft.com/office/drawing/2014/main" id="{EEDE0868-CF1D-4890-AC3C-6582F292F01D}"/>
+                <a16:creationId xmlns:a16="http://schemas.microsoft.com/office/drawing/2014/main" xmlns="" id="{EEDE0868-CF1D-4890-AC3C-6582F292F01D}"/>
               </a:ext>
             </a:extLst>
           </p:cNvPr>
@@ -3509,7 +3533,7 @@
           <p:cNvPr id="40" name="Rectangle 10">
             <a:extLst>
               <a:ext uri="{FF2B5EF4-FFF2-40B4-BE49-F238E27FC236}">
-                <a16:creationId xmlns="" xmlns:a16="http://schemas.microsoft.com/office/drawing/2014/main" id="{EEDE0868-CF1D-4890-AC3C-6582F292F01D}"/>
+                <a16:creationId xmlns:a16="http://schemas.microsoft.com/office/drawing/2014/main" xmlns="" id="{EEDE0868-CF1D-4890-AC3C-6582F292F01D}"/>
               </a:ext>
             </a:extLst>
           </p:cNvPr>
@@ -3631,7 +3655,7 @@
           <p:cNvPr id="44" name="Oval 19">
             <a:extLst>
               <a:ext uri="{FF2B5EF4-FFF2-40B4-BE49-F238E27FC236}">
-                <a16:creationId xmlns="" xmlns:a16="http://schemas.microsoft.com/office/drawing/2014/main" id="{1074244C-1DD6-4F23-BD1E-49DB0CB034EE}"/>
+                <a16:creationId xmlns:a16="http://schemas.microsoft.com/office/drawing/2014/main" xmlns="" id="{1074244C-1DD6-4F23-BD1E-49DB0CB034EE}"/>
               </a:ext>
             </a:extLst>
           </p:cNvPr>
@@ -3708,7 +3732,7 @@
           <p:cNvPr id="45" name="Rectangle 10">
             <a:extLst>
               <a:ext uri="{FF2B5EF4-FFF2-40B4-BE49-F238E27FC236}">
-                <a16:creationId xmlns="" xmlns:a16="http://schemas.microsoft.com/office/drawing/2014/main" id="{EEDE0868-CF1D-4890-AC3C-6582F292F01D}"/>
+                <a16:creationId xmlns:a16="http://schemas.microsoft.com/office/drawing/2014/main" xmlns="" id="{EEDE0868-CF1D-4890-AC3C-6582F292F01D}"/>
               </a:ext>
             </a:extLst>
           </p:cNvPr>
@@ -3790,7 +3814,7 @@
           <p:cNvPr id="48" name="Rectangle 10">
             <a:extLst>
               <a:ext uri="{FF2B5EF4-FFF2-40B4-BE49-F238E27FC236}">
-                <a16:creationId xmlns="" xmlns:a16="http://schemas.microsoft.com/office/drawing/2014/main" id="{EEDE0868-CF1D-4890-AC3C-6582F292F01D}"/>
+                <a16:creationId xmlns:a16="http://schemas.microsoft.com/office/drawing/2014/main" xmlns="" id="{EEDE0868-CF1D-4890-AC3C-6582F292F01D}"/>
               </a:ext>
             </a:extLst>
           </p:cNvPr>
@@ -3886,7 +3910,7 @@
             <p:cNvPr id="55" name="Rectangle 22">
               <a:extLst>
                 <a:ext uri="{FF2B5EF4-FFF2-40B4-BE49-F238E27FC236}">
-                  <a16:creationId xmlns:a16="http://schemas.microsoft.com/office/drawing/2014/main" xmlns="" id="{89DAA49D-E871-4CAE-98D2-BE3A9A446E19}"/>
+                  <a16:creationId xmlns="" xmlns:a16="http://schemas.microsoft.com/office/drawing/2014/main" id="{89DAA49D-E871-4CAE-98D2-BE3A9A446E19}"/>
                 </a:ext>
               </a:extLst>
             </p:cNvPr>
@@ -3964,7 +3988,7 @@
             <p:cNvPr id="56" name="Picture 20">
               <a:extLst>
                 <a:ext uri="{FF2B5EF4-FFF2-40B4-BE49-F238E27FC236}">
-                  <a16:creationId xmlns:a16="http://schemas.microsoft.com/office/drawing/2014/main" xmlns="" id="{141E1B3C-7B28-45B6-8A31-31B62551E2D2}"/>
+                  <a16:creationId xmlns="" xmlns:a16="http://schemas.microsoft.com/office/drawing/2014/main" id="{141E1B3C-7B28-45B6-8A31-31B62551E2D2}"/>
                 </a:ext>
               </a:extLst>
             </p:cNvPr>
@@ -4040,7 +4064,7 @@
             <p:cNvPr id="57" name="Rectangle 22">
               <a:extLst>
                 <a:ext uri="{FF2B5EF4-FFF2-40B4-BE49-F238E27FC236}">
-                  <a16:creationId xmlns:a16="http://schemas.microsoft.com/office/drawing/2014/main" xmlns="" id="{89DAA49D-E871-4CAE-98D2-BE3A9A446E19}"/>
+                  <a16:creationId xmlns="" xmlns:a16="http://schemas.microsoft.com/office/drawing/2014/main" id="{89DAA49D-E871-4CAE-98D2-BE3A9A446E19}"/>
                 </a:ext>
               </a:extLst>
             </p:cNvPr>
@@ -4442,7 +4466,7 @@
           <p:cNvPr id="18" name="Oval 19">
             <a:extLst>
               <a:ext uri="{FF2B5EF4-FFF2-40B4-BE49-F238E27FC236}">
-                <a16:creationId xmlns="" xmlns:a16="http://schemas.microsoft.com/office/drawing/2014/main" id="{1074244C-1DD6-4F23-BD1E-49DB0CB034EE}"/>
+                <a16:creationId xmlns:a16="http://schemas.microsoft.com/office/drawing/2014/main" xmlns="" id="{1074244C-1DD6-4F23-BD1E-49DB0CB034EE}"/>
               </a:ext>
             </a:extLst>
           </p:cNvPr>
@@ -4524,7 +4548,7 @@
           <p:cNvPr id="36" name="Rectangle 10">
             <a:extLst>
               <a:ext uri="{FF2B5EF4-FFF2-40B4-BE49-F238E27FC236}">
-                <a16:creationId xmlns="" xmlns:a16="http://schemas.microsoft.com/office/drawing/2014/main" id="{EEDE0868-CF1D-4890-AC3C-6582F292F01D}"/>
+                <a16:creationId xmlns:a16="http://schemas.microsoft.com/office/drawing/2014/main" xmlns="" id="{EEDE0868-CF1D-4890-AC3C-6582F292F01D}"/>
               </a:ext>
             </a:extLst>
           </p:cNvPr>
@@ -4606,7 +4630,7 @@
           <p:cNvPr id="37" name="Rectangle 10">
             <a:extLst>
               <a:ext uri="{FF2B5EF4-FFF2-40B4-BE49-F238E27FC236}">
-                <a16:creationId xmlns="" xmlns:a16="http://schemas.microsoft.com/office/drawing/2014/main" id="{EEDE0868-CF1D-4890-AC3C-6582F292F01D}"/>
+                <a16:creationId xmlns:a16="http://schemas.microsoft.com/office/drawing/2014/main" xmlns="" id="{EEDE0868-CF1D-4890-AC3C-6582F292F01D}"/>
               </a:ext>
             </a:extLst>
           </p:cNvPr>
@@ -4688,7 +4712,7 @@
           <p:cNvPr id="38" name="Rectangle 10">
             <a:extLst>
               <a:ext uri="{FF2B5EF4-FFF2-40B4-BE49-F238E27FC236}">
-                <a16:creationId xmlns="" xmlns:a16="http://schemas.microsoft.com/office/drawing/2014/main" id="{EEDE0868-CF1D-4890-AC3C-6582F292F01D}"/>
+                <a16:creationId xmlns:a16="http://schemas.microsoft.com/office/drawing/2014/main" xmlns="" id="{EEDE0868-CF1D-4890-AC3C-6582F292F01D}"/>
               </a:ext>
             </a:extLst>
           </p:cNvPr>
@@ -4770,7 +4794,7 @@
           <p:cNvPr id="39" name="Rectangle 10">
             <a:extLst>
               <a:ext uri="{FF2B5EF4-FFF2-40B4-BE49-F238E27FC236}">
-                <a16:creationId xmlns="" xmlns:a16="http://schemas.microsoft.com/office/drawing/2014/main" id="{EEDE0868-CF1D-4890-AC3C-6582F292F01D}"/>
+                <a16:creationId xmlns:a16="http://schemas.microsoft.com/office/drawing/2014/main" xmlns="" id="{EEDE0868-CF1D-4890-AC3C-6582F292F01D}"/>
               </a:ext>
             </a:extLst>
           </p:cNvPr>
@@ -4852,7 +4876,7 @@
           <p:cNvPr id="40" name="Rectangle 10">
             <a:extLst>
               <a:ext uri="{FF2B5EF4-FFF2-40B4-BE49-F238E27FC236}">
-                <a16:creationId xmlns="" xmlns:a16="http://schemas.microsoft.com/office/drawing/2014/main" id="{EEDE0868-CF1D-4890-AC3C-6582F292F01D}"/>
+                <a16:creationId xmlns:a16="http://schemas.microsoft.com/office/drawing/2014/main" xmlns="" id="{EEDE0868-CF1D-4890-AC3C-6582F292F01D}"/>
               </a:ext>
             </a:extLst>
           </p:cNvPr>
@@ -4934,7 +4958,7 @@
           <p:cNvPr id="44" name="Oval 19">
             <a:extLst>
               <a:ext uri="{FF2B5EF4-FFF2-40B4-BE49-F238E27FC236}">
-                <a16:creationId xmlns="" xmlns:a16="http://schemas.microsoft.com/office/drawing/2014/main" id="{1074244C-1DD6-4F23-BD1E-49DB0CB034EE}"/>
+                <a16:creationId xmlns:a16="http://schemas.microsoft.com/office/drawing/2014/main" xmlns="" id="{1074244C-1DD6-4F23-BD1E-49DB0CB034EE}"/>
               </a:ext>
             </a:extLst>
           </p:cNvPr>
@@ -5011,7 +5035,7 @@
           <p:cNvPr id="45" name="Rectangle 10">
             <a:extLst>
               <a:ext uri="{FF2B5EF4-FFF2-40B4-BE49-F238E27FC236}">
-                <a16:creationId xmlns="" xmlns:a16="http://schemas.microsoft.com/office/drawing/2014/main" id="{EEDE0868-CF1D-4890-AC3C-6582F292F01D}"/>
+                <a16:creationId xmlns:a16="http://schemas.microsoft.com/office/drawing/2014/main" xmlns="" id="{EEDE0868-CF1D-4890-AC3C-6582F292F01D}"/>
               </a:ext>
             </a:extLst>
           </p:cNvPr>
@@ -5093,7 +5117,7 @@
           <p:cNvPr id="48" name="Rectangle 10">
             <a:extLst>
               <a:ext uri="{FF2B5EF4-FFF2-40B4-BE49-F238E27FC236}">
-                <a16:creationId xmlns="" xmlns:a16="http://schemas.microsoft.com/office/drawing/2014/main" id="{EEDE0868-CF1D-4890-AC3C-6582F292F01D}"/>
+                <a16:creationId xmlns:a16="http://schemas.microsoft.com/office/drawing/2014/main" xmlns="" id="{EEDE0868-CF1D-4890-AC3C-6582F292F01D}"/>
               </a:ext>
             </a:extLst>
           </p:cNvPr>
@@ -5175,7 +5199,7 @@
           <p:cNvPr id="49" name="Oval 19">
             <a:extLst>
               <a:ext uri="{FF2B5EF4-FFF2-40B4-BE49-F238E27FC236}">
-                <a16:creationId xmlns="" xmlns:a16="http://schemas.microsoft.com/office/drawing/2014/main" id="{1074244C-1DD6-4F23-BD1E-49DB0CB034EE}"/>
+                <a16:creationId xmlns:a16="http://schemas.microsoft.com/office/drawing/2014/main" xmlns="" id="{1074244C-1DD6-4F23-BD1E-49DB0CB034EE}"/>
               </a:ext>
             </a:extLst>
           </p:cNvPr>
@@ -5257,7 +5281,7 @@
           <p:cNvPr id="50" name="Oval 19">
             <a:extLst>
               <a:ext uri="{FF2B5EF4-FFF2-40B4-BE49-F238E27FC236}">
-                <a16:creationId xmlns="" xmlns:a16="http://schemas.microsoft.com/office/drawing/2014/main" id="{1074244C-1DD6-4F23-BD1E-49DB0CB034EE}"/>
+                <a16:creationId xmlns:a16="http://schemas.microsoft.com/office/drawing/2014/main" xmlns="" id="{1074244C-1DD6-4F23-BD1E-49DB0CB034EE}"/>
               </a:ext>
             </a:extLst>
           </p:cNvPr>
@@ -5339,7 +5363,7 @@
           <p:cNvPr id="51" name="Oval 19">
             <a:extLst>
               <a:ext uri="{FF2B5EF4-FFF2-40B4-BE49-F238E27FC236}">
-                <a16:creationId xmlns="" xmlns:a16="http://schemas.microsoft.com/office/drawing/2014/main" id="{1074244C-1DD6-4F23-BD1E-49DB0CB034EE}"/>
+                <a16:creationId xmlns:a16="http://schemas.microsoft.com/office/drawing/2014/main" xmlns="" id="{1074244C-1DD6-4F23-BD1E-49DB0CB034EE}"/>
               </a:ext>
             </a:extLst>
           </p:cNvPr>
@@ -5550,7 +5574,7 @@
           <p:cNvPr id="61" name="Rectangle 10">
             <a:extLst>
               <a:ext uri="{FF2B5EF4-FFF2-40B4-BE49-F238E27FC236}">
-                <a16:creationId xmlns="" xmlns:a16="http://schemas.microsoft.com/office/drawing/2014/main" id="{EEDE0868-CF1D-4890-AC3C-6582F292F01D}"/>
+                <a16:creationId xmlns:a16="http://schemas.microsoft.com/office/drawing/2014/main" xmlns="" id="{EEDE0868-CF1D-4890-AC3C-6582F292F01D}"/>
               </a:ext>
             </a:extLst>
           </p:cNvPr>
@@ -7153,7 +7177,7 @@
   <a:extraClrSchemeLst/>
   <a:extLst>
     <a:ext uri="{05A4C25C-085E-4340-85A3-A5531E510DB2}">
-      <thm15:themeFamily xmlns="" xmlns:thm15="http://schemas.microsoft.com/office/thememl/2012/main" name="Office Theme" id="{62F939B6-93AF-4DB8-9C6B-D6C7DFDC589F}" vid="{4A3C46E8-61CC-4603-A589-7422A47A8E4A}"/>
+      <thm15:themeFamily xmlns:thm15="http://schemas.microsoft.com/office/thememl/2012/main" xmlns="" name="Office Theme" id="{62F939B6-93AF-4DB8-9C6B-D6C7DFDC589F}" vid="{4A3C46E8-61CC-4603-A589-7422A47A8E4A}"/>
     </a:ext>
   </a:extLst>
 </a:theme>

</xml_diff>

<commit_message>
improved main concept diagram
</commit_message>
<xml_diff>
--- a/media/3d_gui_basics.pptx
+++ b/media/3d_gui_basics.pptx
@@ -2974,6 +2974,228 @@
           <a:chExt cx="0" cy="0"/>
         </a:xfrm>
       </p:grpSpPr>
+      <p:pic>
+        <p:nvPicPr>
+          <p:cNvPr id="34" name="Picture 6"/>
+          <p:cNvPicPr>
+            <a:picLocks noChangeAspect="1" noChangeArrowheads="1"/>
+          </p:cNvPicPr>
+          <p:nvPr/>
+        </p:nvPicPr>
+        <p:blipFill rotWithShape="1">
+          <a:blip r:embed="rId2" cstate="print">
+            <a:extLst>
+              <a:ext uri="{BEBA8EAE-BF5A-486C-A8C5-ECC9F3942E4B}">
+                <a14:imgProps xmlns:a14="http://schemas.microsoft.com/office/drawing/2010/main">
+                  <a14:imgLayer r:embed="rId3">
+                    <a14:imgEffect>
+                      <a14:sharpenSoften amount="-50000"/>
+                    </a14:imgEffect>
+                    <a14:imgEffect>
+                      <a14:brightnessContrast bright="40000" contrast="20000"/>
+                    </a14:imgEffect>
+                  </a14:imgLayer>
+                </a14:imgProps>
+              </a:ext>
+              <a:ext uri="{28A0092B-C50C-407E-A947-70E740481C1C}">
+                <a14:useLocalDpi xmlns:a14="http://schemas.microsoft.com/office/drawing/2010/main" val="0"/>
+              </a:ext>
+            </a:extLst>
+          </a:blip>
+          <a:srcRect b="42916"/>
+          <a:stretch/>
+        </p:blipFill>
+        <p:spPr bwMode="auto">
+          <a:xfrm>
+            <a:off x="12092372" y="641974"/>
+            <a:ext cx="1991826" cy="1100908"/>
+          </a:xfrm>
+          <a:prstGeom prst="rect">
+            <a:avLst/>
+          </a:prstGeom>
+          <a:noFill/>
+          <a:ln>
+            <a:noFill/>
+          </a:ln>
+          <a:effectLst/>
+          <a:extLst>
+            <a:ext uri="{909E8E84-426E-40DD-AFC4-6F175D3DCCD1}">
+              <a14:hiddenFill xmlns:a14="http://schemas.microsoft.com/office/drawing/2010/main">
+                <a:solidFill>
+                  <a:schemeClr val="accent1"/>
+                </a:solidFill>
+              </a14:hiddenFill>
+            </a:ext>
+            <a:ext uri="{91240B29-F687-4F45-9708-019B960494DF}">
+              <a14:hiddenLine xmlns:a14="http://schemas.microsoft.com/office/drawing/2010/main" w="9525">
+                <a:solidFill>
+                  <a:schemeClr val="tx1"/>
+                </a:solidFill>
+                <a:miter lim="800000"/>
+                <a:headEnd/>
+                <a:tailEnd/>
+              </a14:hiddenLine>
+            </a:ext>
+            <a:ext uri="{AF507438-7753-43E0-B8FC-AC1667EBCBE1}">
+              <a14:hiddenEffects xmlns:a14="http://schemas.microsoft.com/office/drawing/2010/main">
+                <a:effectLst>
+                  <a:outerShdw dist="35921" dir="2700000" algn="ctr" rotWithShape="0">
+                    <a:schemeClr val="bg2"/>
+                  </a:outerShdw>
+                </a:effectLst>
+              </a14:hiddenEffects>
+            </a:ext>
+          </a:extLst>
+        </p:spPr>
+      </p:pic>
+      <p:pic>
+        <p:nvPicPr>
+          <p:cNvPr id="33" name="Picture 6"/>
+          <p:cNvPicPr>
+            <a:picLocks noChangeAspect="1" noChangeArrowheads="1"/>
+          </p:cNvPicPr>
+          <p:nvPr/>
+        </p:nvPicPr>
+        <p:blipFill rotWithShape="1">
+          <a:blip r:embed="rId2" cstate="print">
+            <a:extLst>
+              <a:ext uri="{BEBA8EAE-BF5A-486C-A8C5-ECC9F3942E4B}">
+                <a14:imgProps xmlns:a14="http://schemas.microsoft.com/office/drawing/2010/main">
+                  <a14:imgLayer r:embed="rId3">
+                    <a14:imgEffect>
+                      <a14:sharpenSoften amount="-50000"/>
+                    </a14:imgEffect>
+                    <a14:imgEffect>
+                      <a14:brightnessContrast bright="40000" contrast="20000"/>
+                    </a14:imgEffect>
+                  </a14:imgLayer>
+                </a14:imgProps>
+              </a:ext>
+              <a:ext uri="{28A0092B-C50C-407E-A947-70E740481C1C}">
+                <a14:useLocalDpi xmlns:a14="http://schemas.microsoft.com/office/drawing/2010/main" val="0"/>
+              </a:ext>
+            </a:extLst>
+          </a:blip>
+          <a:srcRect b="42916"/>
+          <a:stretch/>
+        </p:blipFill>
+        <p:spPr bwMode="auto">
+          <a:xfrm>
+            <a:off x="8370980" y="690075"/>
+            <a:ext cx="1991826" cy="1100908"/>
+          </a:xfrm>
+          <a:prstGeom prst="rect">
+            <a:avLst/>
+          </a:prstGeom>
+          <a:noFill/>
+          <a:ln>
+            <a:noFill/>
+          </a:ln>
+          <a:effectLst/>
+          <a:extLst>
+            <a:ext uri="{909E8E84-426E-40DD-AFC4-6F175D3DCCD1}">
+              <a14:hiddenFill xmlns:a14="http://schemas.microsoft.com/office/drawing/2010/main">
+                <a:solidFill>
+                  <a:schemeClr val="accent1"/>
+                </a:solidFill>
+              </a14:hiddenFill>
+            </a:ext>
+            <a:ext uri="{91240B29-F687-4F45-9708-019B960494DF}">
+              <a14:hiddenLine xmlns:a14="http://schemas.microsoft.com/office/drawing/2010/main" w="9525">
+                <a:solidFill>
+                  <a:schemeClr val="tx1"/>
+                </a:solidFill>
+                <a:miter lim="800000"/>
+                <a:headEnd/>
+                <a:tailEnd/>
+              </a14:hiddenLine>
+            </a:ext>
+            <a:ext uri="{AF507438-7753-43E0-B8FC-AC1667EBCBE1}">
+              <a14:hiddenEffects xmlns:a14="http://schemas.microsoft.com/office/drawing/2010/main">
+                <a:effectLst>
+                  <a:outerShdw dist="35921" dir="2700000" algn="ctr" rotWithShape="0">
+                    <a:schemeClr val="bg2"/>
+                  </a:outerShdw>
+                </a:effectLst>
+              </a14:hiddenEffects>
+            </a:ext>
+          </a:extLst>
+        </p:spPr>
+      </p:pic>
+      <p:pic>
+        <p:nvPicPr>
+          <p:cNvPr id="9" name="Picture 6"/>
+          <p:cNvPicPr>
+            <a:picLocks noChangeAspect="1" noChangeArrowheads="1"/>
+          </p:cNvPicPr>
+          <p:nvPr/>
+        </p:nvPicPr>
+        <p:blipFill rotWithShape="1">
+          <a:blip r:embed="rId2" cstate="print">
+            <a:extLst>
+              <a:ext uri="{BEBA8EAE-BF5A-486C-A8C5-ECC9F3942E4B}">
+                <a14:imgProps xmlns:a14="http://schemas.microsoft.com/office/drawing/2010/main">
+                  <a14:imgLayer r:embed="rId3">
+                    <a14:imgEffect>
+                      <a14:sharpenSoften amount="-50000"/>
+                    </a14:imgEffect>
+                    <a14:imgEffect>
+                      <a14:brightnessContrast bright="40000" contrast="20000"/>
+                    </a14:imgEffect>
+                  </a14:imgLayer>
+                </a14:imgProps>
+              </a:ext>
+              <a:ext uri="{28A0092B-C50C-407E-A947-70E740481C1C}">
+                <a14:useLocalDpi xmlns:a14="http://schemas.microsoft.com/office/drawing/2010/main" val="0"/>
+              </a:ext>
+            </a:extLst>
+          </a:blip>
+          <a:srcRect b="42916"/>
+          <a:stretch/>
+        </p:blipFill>
+        <p:spPr bwMode="auto">
+          <a:xfrm>
+            <a:off x="5244419" y="551912"/>
+            <a:ext cx="1991826" cy="1100908"/>
+          </a:xfrm>
+          <a:prstGeom prst="rect">
+            <a:avLst/>
+          </a:prstGeom>
+          <a:noFill/>
+          <a:ln>
+            <a:noFill/>
+          </a:ln>
+          <a:effectLst/>
+          <a:extLst>
+            <a:ext uri="{909E8E84-426E-40DD-AFC4-6F175D3DCCD1}">
+              <a14:hiddenFill xmlns:a14="http://schemas.microsoft.com/office/drawing/2010/main">
+                <a:solidFill>
+                  <a:schemeClr val="accent1"/>
+                </a:solidFill>
+              </a14:hiddenFill>
+            </a:ext>
+            <a:ext uri="{91240B29-F687-4F45-9708-019B960494DF}">
+              <a14:hiddenLine xmlns:a14="http://schemas.microsoft.com/office/drawing/2010/main" w="9525">
+                <a:solidFill>
+                  <a:schemeClr val="tx1"/>
+                </a:solidFill>
+                <a:miter lim="800000"/>
+                <a:headEnd/>
+                <a:tailEnd/>
+              </a14:hiddenLine>
+            </a:ext>
+            <a:ext uri="{AF507438-7753-43E0-B8FC-AC1667EBCBE1}">
+              <a14:hiddenEffects xmlns:a14="http://schemas.microsoft.com/office/drawing/2010/main">
+                <a:effectLst>
+                  <a:outerShdw dist="35921" dir="2700000" algn="ctr" rotWithShape="0">
+                    <a:schemeClr val="bg2"/>
+                  </a:outerShdw>
+                </a:effectLst>
+              </a14:hiddenEffects>
+            </a:ext>
+          </a:extLst>
+        </p:spPr>
+      </p:pic>
       <p:sp>
         <p:nvSpPr>
           <p:cNvPr id="11" name="Rectangle 10">
@@ -2988,8 +3210,8 @@
         </p:nvSpPr>
         <p:spPr>
           <a:xfrm>
-            <a:off x="5086173" y="1857458"/>
-            <a:ext cx="2555684" cy="527786"/>
+            <a:off x="4614950" y="1857458"/>
+            <a:ext cx="3092377" cy="527786"/>
           </a:xfrm>
           <a:prstGeom prst="rect">
             <a:avLst/>
@@ -3046,15 +3268,7 @@
                   <a:schemeClr val="bg1"/>
                 </a:solidFill>
               </a:rPr>
-              <a:t>3d mouse </a:t>
-            </a:r>
-            <a:r>
-              <a:rPr lang="en-US" dirty="0" smtClean="0">
-                <a:solidFill>
-                  <a:schemeClr val="bg1"/>
-                </a:solidFill>
-              </a:rPr>
-              <a:t>hover</a:t>
+              <a:t>mouse hover (3D)</a:t>
             </a:r>
             <a:endParaRPr lang="en-US" dirty="0">
               <a:solidFill>
@@ -3078,8 +3292,8 @@
         </p:nvSpPr>
         <p:spPr>
           <a:xfrm>
-            <a:off x="8158785" y="1857458"/>
-            <a:ext cx="2555684" cy="527786"/>
+            <a:off x="8048447" y="1857458"/>
+            <a:ext cx="3092377" cy="527786"/>
           </a:xfrm>
           <a:prstGeom prst="rect">
             <a:avLst/>
@@ -3136,7 +3350,7 @@
                   <a:schemeClr val="bg1"/>
                 </a:solidFill>
               </a:rPr>
-              <a:t>3d mouse </a:t>
+              <a:t>mouse </a:t>
             </a:r>
             <a:r>
               <a:rPr lang="en-US" dirty="0" smtClean="0">
@@ -3144,7 +3358,23 @@
                   <a:schemeClr val="bg1"/>
                 </a:solidFill>
               </a:rPr>
-              <a:t>touch click</a:t>
+              <a:t>touch </a:t>
+            </a:r>
+            <a:r>
+              <a:rPr lang="en-US" dirty="0">
+                <a:solidFill>
+                  <a:schemeClr val="bg1"/>
+                </a:solidFill>
+              </a:rPr>
+              <a:t>click (3D</a:t>
+            </a:r>
+            <a:r>
+              <a:rPr lang="en-US" dirty="0" smtClean="0">
+                <a:solidFill>
+                  <a:schemeClr val="bg1"/>
+                </a:solidFill>
+              </a:rPr>
+              <a:t>)</a:t>
             </a:r>
             <a:endParaRPr lang="en-US" dirty="0">
               <a:solidFill>
@@ -3168,8 +3398,8 @@
         </p:nvSpPr>
         <p:spPr>
           <a:xfrm>
-            <a:off x="11750289" y="1857458"/>
-            <a:ext cx="2555684" cy="527786"/>
+            <a:off x="11481943" y="1857458"/>
+            <a:ext cx="3092377" cy="527786"/>
           </a:xfrm>
           <a:prstGeom prst="rect">
             <a:avLst/>
@@ -3226,7 +3456,7 @@
                   <a:schemeClr val="bg1"/>
                 </a:solidFill>
               </a:rPr>
-              <a:t>3d mouse </a:t>
+              <a:t>mouse </a:t>
             </a:r>
             <a:r>
               <a:rPr lang="en-US" dirty="0" smtClean="0">
@@ -3234,7 +3464,15 @@
                   <a:schemeClr val="bg1"/>
                 </a:solidFill>
               </a:rPr>
-              <a:t>touch hold</a:t>
+              <a:t>touch </a:t>
+            </a:r>
+            <a:r>
+              <a:rPr lang="en-US" dirty="0" smtClean="0">
+                <a:solidFill>
+                  <a:schemeClr val="bg1"/>
+                </a:solidFill>
+              </a:rPr>
+              <a:t>hold (3D)</a:t>
             </a:r>
             <a:endParaRPr lang="en-US" dirty="0">
               <a:solidFill>
@@ -3741,7 +3979,7 @@
         </p:nvSpPr>
         <p:spPr>
           <a:xfrm>
-            <a:off x="6487145" y="4368834"/>
+            <a:off x="5364685" y="4368834"/>
             <a:ext cx="2112135" cy="527786"/>
           </a:xfrm>
           <a:prstGeom prst="rect">
@@ -3823,7 +4061,7 @@
         </p:nvSpPr>
         <p:spPr>
           <a:xfrm>
-            <a:off x="4025242" y="4368834"/>
+            <a:off x="2944617" y="4368834"/>
             <a:ext cx="2112135" cy="527786"/>
           </a:xfrm>
           <a:prstGeom prst="rect">
@@ -3998,11 +4236,11 @@
             <p:nvPr/>
           </p:nvPicPr>
           <p:blipFill rotWithShape="1">
-            <a:blip r:embed="rId2" cstate="print">
+            <a:blip r:embed="rId4" cstate="print">
               <a:extLst>
                 <a:ext uri="{BEBA8EAE-BF5A-486C-A8C5-ECC9F3942E4B}">
                   <a14:imgProps xmlns:a14="http://schemas.microsoft.com/office/drawing/2010/main">
-                    <a14:imgLayer r:embed="rId3">
+                    <a14:imgLayer r:embed="rId5">
                       <a14:imgEffect>
                         <a14:backgroundRemoval t="0" b="96154" l="9150" r="89451">
                           <a14:backgroundMark x1="13025" y1="8974" x2="13025" y2="8974"/>
@@ -4142,7 +4380,7 @@
             <p:nvPr/>
           </p:nvPicPr>
           <p:blipFill>
-            <a:blip r:embed="rId4" cstate="print">
+            <a:blip r:embed="rId6" cstate="print">
               <a:extLst>
                 <a:ext uri="{28A0092B-C50C-407E-A947-70E740481C1C}">
                   <a14:useLocalDpi xmlns:a14="http://schemas.microsoft.com/office/drawing/2010/main" val="0"/>
@@ -4184,11 +4422,21 @@
           <p:nvPr/>
         </p:nvPicPr>
         <p:blipFill>
-          <a:blip r:embed="rId5" cstate="print">
+          <a:blip r:embed="rId7" cstate="print">
+            <a:clrChange>
+              <a:clrFrom>
+                <a:srgbClr val="FFFFFF"/>
+              </a:clrFrom>
+              <a:clrTo>
+                <a:srgbClr val="FFFFFF">
+                  <a:alpha val="0"/>
+                </a:srgbClr>
+              </a:clrTo>
+            </a:clrChange>
             <a:extLst>
               <a:ext uri="{BEBA8EAE-BF5A-486C-A8C5-ECC9F3942E4B}">
                 <a14:imgProps xmlns:a14="http://schemas.microsoft.com/office/drawing/2010/main">
-                  <a14:imgLayer r:embed="rId6">
+                  <a14:imgLayer r:embed="rId8">
                     <a14:imgEffect>
                       <a14:brightnessContrast bright="40000"/>
                     </a14:imgEffect>
@@ -4234,11 +4482,21 @@
           <p:nvPr/>
         </p:nvPicPr>
         <p:blipFill>
-          <a:blip r:embed="rId7">
+          <a:blip r:embed="rId9">
+            <a:clrChange>
+              <a:clrFrom>
+                <a:srgbClr val="FDFDFD"/>
+              </a:clrFrom>
+              <a:clrTo>
+                <a:srgbClr val="FDFDFD">
+                  <a:alpha val="0"/>
+                </a:srgbClr>
+              </a:clrTo>
+            </a:clrChange>
             <a:extLst>
               <a:ext uri="{BEBA8EAE-BF5A-486C-A8C5-ECC9F3942E4B}">
                 <a14:imgProps xmlns:a14="http://schemas.microsoft.com/office/drawing/2010/main">
-                  <a14:imgLayer r:embed="rId8">
+                  <a14:imgLayer r:embed="rId10">
                     <a14:imgEffect>
                       <a14:sharpenSoften amount="50000"/>
                     </a14:imgEffect>
@@ -4260,7 +4518,7 @@
         </p:blipFill>
         <p:spPr bwMode="auto">
           <a:xfrm>
-            <a:off x="12393276" y="387548"/>
+            <a:off x="12539863" y="320414"/>
             <a:ext cx="1055951" cy="1055951"/>
           </a:xfrm>
           <a:prstGeom prst="rect">
@@ -4287,7 +4545,17 @@
           <p:nvPr/>
         </p:nvPicPr>
         <p:blipFill>
-          <a:blip r:embed="rId9">
+          <a:blip r:embed="rId11">
+            <a:clrChange>
+              <a:clrFrom>
+                <a:srgbClr val="FFFFFF"/>
+              </a:clrFrom>
+              <a:clrTo>
+                <a:srgbClr val="FFFFFF">
+                  <a:alpha val="0"/>
+                </a:srgbClr>
+              </a:clrTo>
+            </a:clrChange>
             <a:extLst>
               <a:ext uri="{28A0092B-C50C-407E-A947-70E740481C1C}">
                 <a14:useLocalDpi xmlns:a14="http://schemas.microsoft.com/office/drawing/2010/main" val="0"/>
@@ -4301,7 +4569,7 @@
         </p:blipFill>
         <p:spPr bwMode="auto">
           <a:xfrm>
-            <a:off x="5692095" y="360736"/>
+            <a:off x="5702554" y="179579"/>
             <a:ext cx="1590097" cy="1087346"/>
           </a:xfrm>
           <a:prstGeom prst="rect">
@@ -4342,11 +4610,11 @@
             <p:nvPr/>
           </p:nvPicPr>
           <p:blipFill rotWithShape="1">
-            <a:blip r:embed="rId10">
+            <a:blip r:embed="rId12">
               <a:extLst>
                 <a:ext uri="{BEBA8EAE-BF5A-486C-A8C5-ECC9F3942E4B}">
                   <a14:imgProps xmlns:a14="http://schemas.microsoft.com/office/drawing/2010/main">
-                    <a14:imgLayer r:embed="rId11">
+                    <a14:imgLayer r:embed="rId13">
                       <a14:imgEffect>
                         <a14:brightnessContrast contrast="40000"/>
                       </a14:imgEffect>
@@ -4390,7 +4658,7 @@
             <p:nvPr/>
           </p:nvPicPr>
           <p:blipFill rotWithShape="1">
-            <a:blip r:embed="rId9">
+            <a:blip r:embed="rId11">
               <a:clrChange>
                 <a:clrFrom>
                   <a:srgbClr val="FFFFFF"/>
@@ -4431,6 +4699,326 @@
           </p:spPr>
         </p:pic>
       </p:grpSp>
+      <p:sp>
+        <p:nvSpPr>
+          <p:cNvPr id="27" name="Rectangle 10">
+            <a:extLst>
+              <a:ext uri="{FF2B5EF4-FFF2-40B4-BE49-F238E27FC236}">
+                <a16:creationId xmlns:a16="http://schemas.microsoft.com/office/drawing/2014/main" xmlns="" id="{EEDE0868-CF1D-4890-AC3C-6582F292F01D}"/>
+              </a:ext>
+            </a:extLst>
+          </p:cNvPr>
+          <p:cNvSpPr/>
+          <p:nvPr/>
+        </p:nvSpPr>
+        <p:spPr>
+          <a:xfrm>
+            <a:off x="7784754" y="4368834"/>
+            <a:ext cx="2112135" cy="527786"/>
+          </a:xfrm>
+          <a:prstGeom prst="rect">
+            <a:avLst/>
+          </a:prstGeom>
+          <a:solidFill>
+            <a:srgbClr val="008E40"/>
+          </a:solidFill>
+          <a:ln>
+            <a:noFill/>
+          </a:ln>
+          <a:effectLst>
+            <a:outerShdw blurRad="149987" dist="250190" dir="8460000" algn="ctr">
+              <a:srgbClr val="000000">
+                <a:alpha val="28000"/>
+              </a:srgbClr>
+            </a:outerShdw>
+          </a:effectLst>
+          <a:scene3d>
+            <a:camera prst="orthographicFront">
+              <a:rot lat="0" lon="0" rev="0"/>
+            </a:camera>
+            <a:lightRig rig="contrasting" dir="t">
+              <a:rot lat="0" lon="0" rev="1500000"/>
+            </a:lightRig>
+          </a:scene3d>
+          <a:sp3d prstMaterial="metal">
+            <a:bevelT w="88900" h="88900"/>
+          </a:sp3d>
+        </p:spPr>
+        <p:style>
+          <a:lnRef idx="2">
+            <a:schemeClr val="accent1">
+              <a:shade val="50000"/>
+            </a:schemeClr>
+          </a:lnRef>
+          <a:fillRef idx="1">
+            <a:schemeClr val="accent1"/>
+          </a:fillRef>
+          <a:effectRef idx="0">
+            <a:schemeClr val="accent1"/>
+          </a:effectRef>
+          <a:fontRef idx="minor">
+            <a:schemeClr val="lt1"/>
+          </a:fontRef>
+        </p:style>
+        <p:txBody>
+          <a:bodyPr rtlCol="0" anchor="ctr"/>
+          <a:lstStyle/>
+          <a:p>
+            <a:pPr algn="ctr"/>
+            <a:r>
+              <a:rPr lang="en-US" dirty="0" smtClean="0">
+                <a:solidFill>
+                  <a:schemeClr val="bg1"/>
+                </a:solidFill>
+              </a:rPr>
+              <a:t>light</a:t>
+            </a:r>
+            <a:endParaRPr lang="en-US" dirty="0">
+              <a:solidFill>
+                <a:schemeClr val="bg1"/>
+              </a:solidFill>
+            </a:endParaRPr>
+          </a:p>
+        </p:txBody>
+      </p:sp>
+      <p:pic>
+        <p:nvPicPr>
+          <p:cNvPr id="6" name="Picture 2"/>
+          <p:cNvPicPr>
+            <a:picLocks noChangeAspect="1" noChangeArrowheads="1"/>
+          </p:cNvPicPr>
+          <p:nvPr/>
+        </p:nvPicPr>
+        <p:blipFill>
+          <a:blip r:embed="rId14" cstate="print">
+            <a:clrChange>
+              <a:clrFrom>
+                <a:srgbClr val="FFFFFF"/>
+              </a:clrFrom>
+              <a:clrTo>
+                <a:srgbClr val="FFFFFF">
+                  <a:alpha val="0"/>
+                </a:srgbClr>
+              </a:clrTo>
+            </a:clrChange>
+            <a:extLst>
+              <a:ext uri="{28A0092B-C50C-407E-A947-70E740481C1C}">
+                <a14:useLocalDpi xmlns:a14="http://schemas.microsoft.com/office/drawing/2010/main" val="0"/>
+              </a:ext>
+            </a:extLst>
+          </a:blip>
+          <a:srcRect/>
+          <a:stretch>
+            <a:fillRect/>
+          </a:stretch>
+        </p:blipFill>
+        <p:spPr bwMode="auto">
+          <a:xfrm rot="264561">
+            <a:off x="12479614" y="4893567"/>
+            <a:ext cx="883273" cy="1814758"/>
+          </a:xfrm>
+          <a:prstGeom prst="rect">
+            <a:avLst/>
+          </a:prstGeom>
+          <a:noFill/>
+          <a:ln>
+            <a:noFill/>
+          </a:ln>
+          <a:effectLst/>
+          <a:extLst>
+            <a:ext uri="{909E8E84-426E-40DD-AFC4-6F175D3DCCD1}">
+              <a14:hiddenFill xmlns:a14="http://schemas.microsoft.com/office/drawing/2010/main">
+                <a:solidFill>
+                  <a:schemeClr val="accent1"/>
+                </a:solidFill>
+              </a14:hiddenFill>
+            </a:ext>
+            <a:ext uri="{91240B29-F687-4F45-9708-019B960494DF}">
+              <a14:hiddenLine xmlns:a14="http://schemas.microsoft.com/office/drawing/2010/main" w="9525">
+                <a:solidFill>
+                  <a:schemeClr val="tx1"/>
+                </a:solidFill>
+                <a:miter lim="800000"/>
+                <a:headEnd/>
+                <a:tailEnd/>
+              </a14:hiddenLine>
+            </a:ext>
+            <a:ext uri="{AF507438-7753-43E0-B8FC-AC1667EBCBE1}">
+              <a14:hiddenEffects xmlns:a14="http://schemas.microsoft.com/office/drawing/2010/main">
+                <a:effectLst>
+                  <a:outerShdw dist="35921" dir="2700000" algn="ctr" rotWithShape="0">
+                    <a:schemeClr val="bg2"/>
+                  </a:outerShdw>
+                </a:effectLst>
+              </a14:hiddenEffects>
+            </a:ext>
+          </a:extLst>
+        </p:spPr>
+      </p:pic>
+      <p:pic>
+        <p:nvPicPr>
+          <p:cNvPr id="1027" name="Picture 3" descr="C:\Users\wass\Downloads\download (3).png"/>
+          <p:cNvPicPr>
+            <a:picLocks noChangeAspect="1" noChangeArrowheads="1"/>
+          </p:cNvPicPr>
+          <p:nvPr/>
+        </p:nvPicPr>
+        <p:blipFill>
+          <a:blip r:embed="rId15">
+            <a:extLst>
+              <a:ext uri="{BEBA8EAE-BF5A-486C-A8C5-ECC9F3942E4B}">
+                <a14:imgProps xmlns:a14="http://schemas.microsoft.com/office/drawing/2010/main">
+                  <a14:imgLayer r:embed="rId16">
+                    <a14:imgEffect>
+                      <a14:brightnessContrast bright="40000"/>
+                    </a14:imgEffect>
+                  </a14:imgLayer>
+                </a14:imgProps>
+              </a:ext>
+              <a:ext uri="{28A0092B-C50C-407E-A947-70E740481C1C}">
+                <a14:useLocalDpi xmlns:a14="http://schemas.microsoft.com/office/drawing/2010/main" val="0"/>
+              </a:ext>
+            </a:extLst>
+          </a:blip>
+          <a:srcRect/>
+          <a:stretch>
+            <a:fillRect/>
+          </a:stretch>
+        </p:blipFill>
+        <p:spPr bwMode="auto">
+          <a:xfrm>
+            <a:off x="3215904" y="5137993"/>
+            <a:ext cx="1325907" cy="1325907"/>
+          </a:xfrm>
+          <a:prstGeom prst="rect">
+            <a:avLst/>
+          </a:prstGeom>
+          <a:noFill/>
+          <a:extLst>
+            <a:ext uri="{909E8E84-426E-40DD-AFC4-6F175D3DCCD1}">
+              <a14:hiddenFill xmlns:a14="http://schemas.microsoft.com/office/drawing/2010/main">
+                <a:solidFill>
+                  <a:srgbClr val="FFFFFF"/>
+                </a:solidFill>
+              </a14:hiddenFill>
+            </a:ext>
+          </a:extLst>
+        </p:spPr>
+      </p:pic>
+      <p:pic>
+        <p:nvPicPr>
+          <p:cNvPr id="7" name="Picture 4"/>
+          <p:cNvPicPr>
+            <a:picLocks noChangeAspect="1" noChangeArrowheads="1"/>
+          </p:cNvPicPr>
+          <p:nvPr/>
+        </p:nvPicPr>
+        <p:blipFill>
+          <a:blip r:embed="rId17">
+            <a:extLst>
+              <a:ext uri="{28A0092B-C50C-407E-A947-70E740481C1C}">
+                <a14:useLocalDpi xmlns:a14="http://schemas.microsoft.com/office/drawing/2010/main" val="0"/>
+              </a:ext>
+            </a:extLst>
+          </a:blip>
+          <a:srcRect/>
+          <a:stretch>
+            <a:fillRect/>
+          </a:stretch>
+        </p:blipFill>
+        <p:spPr bwMode="auto">
+          <a:xfrm>
+            <a:off x="5702554" y="5137994"/>
+            <a:ext cx="1329421" cy="1335686"/>
+          </a:xfrm>
+          <a:prstGeom prst="rect">
+            <a:avLst/>
+          </a:prstGeom>
+          <a:noFill/>
+          <a:ln>
+            <a:noFill/>
+          </a:ln>
+          <a:effectLst/>
+          <a:extLst>
+            <a:ext uri="{909E8E84-426E-40DD-AFC4-6F175D3DCCD1}">
+              <a14:hiddenFill xmlns:a14="http://schemas.microsoft.com/office/drawing/2010/main">
+                <a:solidFill>
+                  <a:schemeClr val="accent1"/>
+                </a:solidFill>
+              </a14:hiddenFill>
+            </a:ext>
+            <a:ext uri="{91240B29-F687-4F45-9708-019B960494DF}">
+              <a14:hiddenLine xmlns:a14="http://schemas.microsoft.com/office/drawing/2010/main" w="9525">
+                <a:solidFill>
+                  <a:schemeClr val="tx1"/>
+                </a:solidFill>
+                <a:miter lim="800000"/>
+                <a:headEnd/>
+                <a:tailEnd/>
+              </a14:hiddenLine>
+            </a:ext>
+            <a:ext uri="{AF507438-7753-43E0-B8FC-AC1667EBCBE1}">
+              <a14:hiddenEffects xmlns:a14="http://schemas.microsoft.com/office/drawing/2010/main">
+                <a:effectLst>
+                  <a:outerShdw dist="35921" dir="2700000" algn="ctr" rotWithShape="0">
+                    <a:schemeClr val="bg2"/>
+                  </a:outerShdw>
+                </a:effectLst>
+              </a14:hiddenEffects>
+            </a:ext>
+          </a:extLst>
+        </p:spPr>
+      </p:pic>
+      <p:pic>
+        <p:nvPicPr>
+          <p:cNvPr id="8" name="Picture 5" descr="C:\Users\wass\Downloads\download (4).png"/>
+          <p:cNvPicPr>
+            <a:picLocks noChangeAspect="1" noChangeArrowheads="1"/>
+          </p:cNvPicPr>
+          <p:nvPr/>
+        </p:nvPicPr>
+        <p:blipFill>
+          <a:blip r:embed="rId18">
+            <a:extLst>
+              <a:ext uri="{BEBA8EAE-BF5A-486C-A8C5-ECC9F3942E4B}">
+                <a14:imgProps xmlns:a14="http://schemas.microsoft.com/office/drawing/2010/main">
+                  <a14:imgLayer r:embed="rId19">
+                    <a14:imgEffect>
+                      <a14:brightnessContrast contrast="40000"/>
+                    </a14:imgEffect>
+                  </a14:imgLayer>
+                </a14:imgProps>
+              </a:ext>
+              <a:ext uri="{28A0092B-C50C-407E-A947-70E740481C1C}">
+                <a14:useLocalDpi xmlns:a14="http://schemas.microsoft.com/office/drawing/2010/main" val="0"/>
+              </a:ext>
+            </a:extLst>
+          </a:blip>
+          <a:srcRect/>
+          <a:stretch>
+            <a:fillRect/>
+          </a:stretch>
+        </p:blipFill>
+        <p:spPr bwMode="auto">
+          <a:xfrm>
+            <a:off x="8370980" y="5186867"/>
+            <a:ext cx="1320932" cy="1320932"/>
+          </a:xfrm>
+          <a:prstGeom prst="rect">
+            <a:avLst/>
+          </a:prstGeom>
+          <a:noFill/>
+          <a:extLst>
+            <a:ext uri="{909E8E84-426E-40DD-AFC4-6F175D3DCCD1}">
+              <a14:hiddenFill xmlns:a14="http://schemas.microsoft.com/office/drawing/2010/main">
+                <a:solidFill>
+                  <a:srgbClr val="FFFFFF"/>
+                </a:solidFill>
+              </a14:hiddenFill>
+            </a:ext>
+          </a:extLst>
+        </p:spPr>
+      </p:pic>
     </p:spTree>
     <p:extLst>
       <p:ext uri="{BB962C8B-B14F-4D97-AF65-F5344CB8AC3E}">

</xml_diff>

<commit_message>
doc and preparation for multi param
</commit_message>
<xml_diff>
--- a/media/3d_gui_basics.pptx
+++ b/media/3d_gui_basics.pptx
@@ -107,7 +107,7 @@
   </p:defaultTextStyle>
   <p:extLst>
     <p:ext uri="{EFAFB233-063F-42B5-8137-9DF3F51BA10A}">
-      <p15:sldGuideLst xmlns:p15="http://schemas.microsoft.com/office/powerpoint/2012/main" xmlns=""/>
+      <p15:sldGuideLst xmlns="" xmlns:p15="http://schemas.microsoft.com/office/powerpoint/2012/main"/>
     </p:ext>
   </p:extLst>
 </p:presentation>
@@ -244,7 +244,7 @@
           <a:p>
             <a:fld id="{419CB8D1-FFEF-47F0-BFBD-4EFA5AB5D710}" type="datetimeFigureOut">
               <a:rPr lang="en-US" smtClean="0"/>
-              <a:t>12/27/2019</a:t>
+              <a:t>12/28/2019</a:t>
             </a:fld>
             <a:endParaRPr lang="en-US"/>
           </a:p>
@@ -414,7 +414,7 @@
           <a:p>
             <a:fld id="{419CB8D1-FFEF-47F0-BFBD-4EFA5AB5D710}" type="datetimeFigureOut">
               <a:rPr lang="en-US" smtClean="0"/>
-              <a:t>12/27/2019</a:t>
+              <a:t>12/28/2019</a:t>
             </a:fld>
             <a:endParaRPr lang="en-US"/>
           </a:p>
@@ -594,7 +594,7 @@
           <a:p>
             <a:fld id="{419CB8D1-FFEF-47F0-BFBD-4EFA5AB5D710}" type="datetimeFigureOut">
               <a:rPr lang="en-US" smtClean="0"/>
-              <a:t>12/27/2019</a:t>
+              <a:t>12/28/2019</a:t>
             </a:fld>
             <a:endParaRPr lang="en-US"/>
           </a:p>
@@ -764,7 +764,7 @@
           <a:p>
             <a:fld id="{419CB8D1-FFEF-47F0-BFBD-4EFA5AB5D710}" type="datetimeFigureOut">
               <a:rPr lang="en-US" smtClean="0"/>
-              <a:t>12/27/2019</a:t>
+              <a:t>12/28/2019</a:t>
             </a:fld>
             <a:endParaRPr lang="en-US"/>
           </a:p>
@@ -1010,7 +1010,7 @@
           <a:p>
             <a:fld id="{419CB8D1-FFEF-47F0-BFBD-4EFA5AB5D710}" type="datetimeFigureOut">
               <a:rPr lang="en-US" smtClean="0"/>
-              <a:t>12/27/2019</a:t>
+              <a:t>12/28/2019</a:t>
             </a:fld>
             <a:endParaRPr lang="en-US"/>
           </a:p>
@@ -1242,7 +1242,7 @@
           <a:p>
             <a:fld id="{419CB8D1-FFEF-47F0-BFBD-4EFA5AB5D710}" type="datetimeFigureOut">
               <a:rPr lang="en-US" smtClean="0"/>
-              <a:t>12/27/2019</a:t>
+              <a:t>12/28/2019</a:t>
             </a:fld>
             <a:endParaRPr lang="en-US"/>
           </a:p>
@@ -1609,7 +1609,7 @@
           <a:p>
             <a:fld id="{419CB8D1-FFEF-47F0-BFBD-4EFA5AB5D710}" type="datetimeFigureOut">
               <a:rPr lang="en-US" smtClean="0"/>
-              <a:t>12/27/2019</a:t>
+              <a:t>12/28/2019</a:t>
             </a:fld>
             <a:endParaRPr lang="en-US"/>
           </a:p>
@@ -1727,7 +1727,7 @@
           <a:p>
             <a:fld id="{419CB8D1-FFEF-47F0-BFBD-4EFA5AB5D710}" type="datetimeFigureOut">
               <a:rPr lang="en-US" smtClean="0"/>
-              <a:t>12/27/2019</a:t>
+              <a:t>12/28/2019</a:t>
             </a:fld>
             <a:endParaRPr lang="en-US"/>
           </a:p>
@@ -1822,7 +1822,7 @@
           <a:p>
             <a:fld id="{419CB8D1-FFEF-47F0-BFBD-4EFA5AB5D710}" type="datetimeFigureOut">
               <a:rPr lang="en-US" smtClean="0"/>
-              <a:t>12/27/2019</a:t>
+              <a:t>12/28/2019</a:t>
             </a:fld>
             <a:endParaRPr lang="en-US"/>
           </a:p>
@@ -2099,7 +2099,7 @@
           <a:p>
             <a:fld id="{419CB8D1-FFEF-47F0-BFBD-4EFA5AB5D710}" type="datetimeFigureOut">
               <a:rPr lang="en-US" smtClean="0"/>
-              <a:t>12/27/2019</a:t>
+              <a:t>12/28/2019</a:t>
             </a:fld>
             <a:endParaRPr lang="en-US"/>
           </a:p>
@@ -2356,7 +2356,7 @@
           <a:p>
             <a:fld id="{419CB8D1-FFEF-47F0-BFBD-4EFA5AB5D710}" type="datetimeFigureOut">
               <a:rPr lang="en-US" smtClean="0"/>
-              <a:t>12/27/2019</a:t>
+              <a:t>12/28/2019</a:t>
             </a:fld>
             <a:endParaRPr lang="en-US"/>
           </a:p>
@@ -2569,7 +2569,7 @@
           <a:p>
             <a:fld id="{419CB8D1-FFEF-47F0-BFBD-4EFA5AB5D710}" type="datetimeFigureOut">
               <a:rPr lang="en-US" smtClean="0"/>
-              <a:t>12/27/2019</a:t>
+              <a:t>12/28/2019</a:t>
             </a:fld>
             <a:endParaRPr lang="en-US"/>
           </a:p>
@@ -3201,7 +3201,7 @@
           <p:cNvPr id="11" name="Rectangle 10">
             <a:extLst>
               <a:ext uri="{FF2B5EF4-FFF2-40B4-BE49-F238E27FC236}">
-                <a16:creationId xmlns:a16="http://schemas.microsoft.com/office/drawing/2014/main" xmlns="" id="{EEDE0868-CF1D-4890-AC3C-6582F292F01D}"/>
+                <a16:creationId xmlns="" xmlns:a16="http://schemas.microsoft.com/office/drawing/2014/main" id="{EEDE0868-CF1D-4890-AC3C-6582F292F01D}"/>
               </a:ext>
             </a:extLst>
           </p:cNvPr>
@@ -3283,7 +3283,7 @@
           <p:cNvPr id="13" name="Rectangle 10">
             <a:extLst>
               <a:ext uri="{FF2B5EF4-FFF2-40B4-BE49-F238E27FC236}">
-                <a16:creationId xmlns:a16="http://schemas.microsoft.com/office/drawing/2014/main" xmlns="" id="{EEDE0868-CF1D-4890-AC3C-6582F292F01D}"/>
+                <a16:creationId xmlns="" xmlns:a16="http://schemas.microsoft.com/office/drawing/2014/main" id="{EEDE0868-CF1D-4890-AC3C-6582F292F01D}"/>
               </a:ext>
             </a:extLst>
           </p:cNvPr>
@@ -3350,15 +3350,7 @@
                   <a:schemeClr val="bg1"/>
                 </a:solidFill>
               </a:rPr>
-              <a:t>mouse </a:t>
-            </a:r>
-            <a:r>
-              <a:rPr lang="en-US" dirty="0" smtClean="0">
-                <a:solidFill>
-                  <a:schemeClr val="bg1"/>
-                </a:solidFill>
-              </a:rPr>
-              <a:t>touch </a:t>
+              <a:t>mouse touch </a:t>
             </a:r>
             <a:r>
               <a:rPr lang="en-US" dirty="0">
@@ -3389,7 +3381,7 @@
           <p:cNvPr id="17" name="Rectangle 10">
             <a:extLst>
               <a:ext uri="{FF2B5EF4-FFF2-40B4-BE49-F238E27FC236}">
-                <a16:creationId xmlns:a16="http://schemas.microsoft.com/office/drawing/2014/main" xmlns="" id="{EEDE0868-CF1D-4890-AC3C-6582F292F01D}"/>
+                <a16:creationId xmlns="" xmlns:a16="http://schemas.microsoft.com/office/drawing/2014/main" id="{EEDE0868-CF1D-4890-AC3C-6582F292F01D}"/>
               </a:ext>
             </a:extLst>
           </p:cNvPr>
@@ -3456,23 +3448,7 @@
                   <a:schemeClr val="bg1"/>
                 </a:solidFill>
               </a:rPr>
-              <a:t>mouse </a:t>
-            </a:r>
-            <a:r>
-              <a:rPr lang="en-US" dirty="0" smtClean="0">
-                <a:solidFill>
-                  <a:schemeClr val="bg1"/>
-                </a:solidFill>
-              </a:rPr>
-              <a:t>touch </a:t>
-            </a:r>
-            <a:r>
-              <a:rPr lang="en-US" dirty="0" smtClean="0">
-                <a:solidFill>
-                  <a:schemeClr val="bg1"/>
-                </a:solidFill>
-              </a:rPr>
-              <a:t>hold (3D)</a:t>
+              <a:t>mouse touch hold (3D)</a:t>
             </a:r>
             <a:endParaRPr lang="en-US" dirty="0">
               <a:solidFill>
@@ -3487,7 +3463,7 @@
           <p:cNvPr id="18" name="Oval 19">
             <a:extLst>
               <a:ext uri="{FF2B5EF4-FFF2-40B4-BE49-F238E27FC236}">
-                <a16:creationId xmlns:a16="http://schemas.microsoft.com/office/drawing/2014/main" xmlns="" id="{1074244C-1DD6-4F23-BD1E-49DB0CB034EE}"/>
+                <a16:creationId xmlns="" xmlns:a16="http://schemas.microsoft.com/office/drawing/2014/main" id="{1074244C-1DD6-4F23-BD1E-49DB0CB034EE}"/>
               </a:ext>
             </a:extLst>
           </p:cNvPr>
@@ -3569,7 +3545,7 @@
           <p:cNvPr id="19" name="Rectangle 10">
             <a:extLst>
               <a:ext uri="{FF2B5EF4-FFF2-40B4-BE49-F238E27FC236}">
-                <a16:creationId xmlns:a16="http://schemas.microsoft.com/office/drawing/2014/main" xmlns="" id="{EEDE0868-CF1D-4890-AC3C-6582F292F01D}"/>
+                <a16:creationId xmlns="" xmlns:a16="http://schemas.microsoft.com/office/drawing/2014/main" id="{EEDE0868-CF1D-4890-AC3C-6582F292F01D}"/>
               </a:ext>
             </a:extLst>
           </p:cNvPr>
@@ -3654,7 +3630,7 @@
         </p:nvCxnSpPr>
         <p:spPr>
           <a:xfrm>
-            <a:off x="4025241" y="2713343"/>
+            <a:off x="4166248" y="2685866"/>
             <a:ext cx="751126" cy="693992"/>
           </a:xfrm>
           <a:prstGeom prst="straightConnector1">
@@ -3771,7 +3747,7 @@
           <p:cNvPr id="40" name="Rectangle 10">
             <a:extLst>
               <a:ext uri="{FF2B5EF4-FFF2-40B4-BE49-F238E27FC236}">
-                <a16:creationId xmlns:a16="http://schemas.microsoft.com/office/drawing/2014/main" xmlns="" id="{EEDE0868-CF1D-4890-AC3C-6582F292F01D}"/>
+                <a16:creationId xmlns="" xmlns:a16="http://schemas.microsoft.com/office/drawing/2014/main" id="{EEDE0868-CF1D-4890-AC3C-6582F292F01D}"/>
               </a:ext>
             </a:extLst>
           </p:cNvPr>
@@ -3893,7 +3869,7 @@
           <p:cNvPr id="44" name="Oval 19">
             <a:extLst>
               <a:ext uri="{FF2B5EF4-FFF2-40B4-BE49-F238E27FC236}">
-                <a16:creationId xmlns:a16="http://schemas.microsoft.com/office/drawing/2014/main" xmlns="" id="{1074244C-1DD6-4F23-BD1E-49DB0CB034EE}"/>
+                <a16:creationId xmlns="" xmlns:a16="http://schemas.microsoft.com/office/drawing/2014/main" id="{1074244C-1DD6-4F23-BD1E-49DB0CB034EE}"/>
               </a:ext>
             </a:extLst>
           </p:cNvPr>
@@ -3970,7 +3946,7 @@
           <p:cNvPr id="45" name="Rectangle 10">
             <a:extLst>
               <a:ext uri="{FF2B5EF4-FFF2-40B4-BE49-F238E27FC236}">
-                <a16:creationId xmlns:a16="http://schemas.microsoft.com/office/drawing/2014/main" xmlns="" id="{EEDE0868-CF1D-4890-AC3C-6582F292F01D}"/>
+                <a16:creationId xmlns="" xmlns:a16="http://schemas.microsoft.com/office/drawing/2014/main" id="{EEDE0868-CF1D-4890-AC3C-6582F292F01D}"/>
               </a:ext>
             </a:extLst>
           </p:cNvPr>
@@ -4052,7 +4028,7 @@
           <p:cNvPr id="48" name="Rectangle 10">
             <a:extLst>
               <a:ext uri="{FF2B5EF4-FFF2-40B4-BE49-F238E27FC236}">
-                <a16:creationId xmlns:a16="http://schemas.microsoft.com/office/drawing/2014/main" xmlns="" id="{EEDE0868-CF1D-4890-AC3C-6582F292F01D}"/>
+                <a16:creationId xmlns="" xmlns:a16="http://schemas.microsoft.com/office/drawing/2014/main" id="{EEDE0868-CF1D-4890-AC3C-6582F292F01D}"/>
               </a:ext>
             </a:extLst>
           </p:cNvPr>
@@ -4148,7 +4124,7 @@
             <p:cNvPr id="55" name="Rectangle 22">
               <a:extLst>
                 <a:ext uri="{FF2B5EF4-FFF2-40B4-BE49-F238E27FC236}">
-                  <a16:creationId xmlns="" xmlns:a16="http://schemas.microsoft.com/office/drawing/2014/main" id="{89DAA49D-E871-4CAE-98D2-BE3A9A446E19}"/>
+                  <a16:creationId xmlns:a16="http://schemas.microsoft.com/office/drawing/2014/main" xmlns="" id="{89DAA49D-E871-4CAE-98D2-BE3A9A446E19}"/>
                 </a:ext>
               </a:extLst>
             </p:cNvPr>
@@ -4226,7 +4202,7 @@
             <p:cNvPr id="56" name="Picture 20">
               <a:extLst>
                 <a:ext uri="{FF2B5EF4-FFF2-40B4-BE49-F238E27FC236}">
-                  <a16:creationId xmlns="" xmlns:a16="http://schemas.microsoft.com/office/drawing/2014/main" id="{141E1B3C-7B28-45B6-8A31-31B62551E2D2}"/>
+                  <a16:creationId xmlns:a16="http://schemas.microsoft.com/office/drawing/2014/main" xmlns="" id="{141E1B3C-7B28-45B6-8A31-31B62551E2D2}"/>
                 </a:ext>
               </a:extLst>
             </p:cNvPr>
@@ -4302,7 +4278,7 @@
             <p:cNvPr id="57" name="Rectangle 22">
               <a:extLst>
                 <a:ext uri="{FF2B5EF4-FFF2-40B4-BE49-F238E27FC236}">
-                  <a16:creationId xmlns="" xmlns:a16="http://schemas.microsoft.com/office/drawing/2014/main" id="{89DAA49D-E871-4CAE-98D2-BE3A9A446E19}"/>
+                  <a16:creationId xmlns:a16="http://schemas.microsoft.com/office/drawing/2014/main" xmlns="" id="{89DAA49D-E871-4CAE-98D2-BE3A9A446E19}"/>
                 </a:ext>
               </a:extLst>
             </p:cNvPr>
@@ -4704,7 +4680,7 @@
           <p:cNvPr id="27" name="Rectangle 10">
             <a:extLst>
               <a:ext uri="{FF2B5EF4-FFF2-40B4-BE49-F238E27FC236}">
-                <a16:creationId xmlns:a16="http://schemas.microsoft.com/office/drawing/2014/main" xmlns="" id="{EEDE0868-CF1D-4890-AC3C-6582F292F01D}"/>
+                <a16:creationId xmlns="" xmlns:a16="http://schemas.microsoft.com/office/drawing/2014/main" id="{EEDE0868-CF1D-4890-AC3C-6582F292F01D}"/>
               </a:ext>
             </a:extLst>
           </p:cNvPr>
@@ -5019,6 +4995,86 @@
           </a:extLst>
         </p:spPr>
       </p:pic>
+      <p:cxnSp>
+        <p:nvCxnSpPr>
+          <p:cNvPr id="35" name="Gerade Verbindung mit Pfeil 34"/>
+          <p:cNvCxnSpPr/>
+          <p:nvPr/>
+        </p:nvCxnSpPr>
+        <p:spPr>
+          <a:xfrm flipH="1" flipV="1">
+            <a:off x="3773347" y="2929540"/>
+            <a:ext cx="719946" cy="692051"/>
+          </a:xfrm>
+          <a:prstGeom prst="straightConnector1">
+            <a:avLst/>
+          </a:prstGeom>
+          <a:ln w="76200">
+            <a:tailEnd type="arrow"/>
+          </a:ln>
+          <a:effectLst>
+            <a:outerShdw blurRad="50800" dist="38100" dir="8100000" algn="tr" rotWithShape="0">
+              <a:prstClr val="black">
+                <a:alpha val="40000"/>
+              </a:prstClr>
+            </a:outerShdw>
+          </a:effectLst>
+        </p:spPr>
+        <p:style>
+          <a:lnRef idx="1">
+            <a:schemeClr val="accent1"/>
+          </a:lnRef>
+          <a:fillRef idx="0">
+            <a:schemeClr val="accent1"/>
+          </a:fillRef>
+          <a:effectRef idx="0">
+            <a:schemeClr val="accent1"/>
+          </a:effectRef>
+          <a:fontRef idx="minor">
+            <a:schemeClr val="tx1"/>
+          </a:fontRef>
+        </p:style>
+      </p:cxnSp>
+      <p:cxnSp>
+        <p:nvCxnSpPr>
+          <p:cNvPr id="37" name="Gerade Verbindung mit Pfeil 36"/>
+          <p:cNvCxnSpPr/>
+          <p:nvPr/>
+        </p:nvCxnSpPr>
+        <p:spPr>
+          <a:xfrm flipH="1">
+            <a:off x="8729057" y="3832049"/>
+            <a:ext cx="2046973" cy="0"/>
+          </a:xfrm>
+          <a:prstGeom prst="straightConnector1">
+            <a:avLst/>
+          </a:prstGeom>
+          <a:ln w="76200">
+            <a:tailEnd type="arrow"/>
+          </a:ln>
+          <a:effectLst>
+            <a:outerShdw blurRad="50800" dist="38100" dir="8100000" algn="tr" rotWithShape="0">
+              <a:prstClr val="black">
+                <a:alpha val="40000"/>
+              </a:prstClr>
+            </a:outerShdw>
+          </a:effectLst>
+        </p:spPr>
+        <p:style>
+          <a:lnRef idx="1">
+            <a:schemeClr val="accent1"/>
+          </a:lnRef>
+          <a:fillRef idx="0">
+            <a:schemeClr val="accent1"/>
+          </a:fillRef>
+          <a:effectRef idx="0">
+            <a:schemeClr val="accent1"/>
+          </a:effectRef>
+          <a:fontRef idx="minor">
+            <a:schemeClr val="tx1"/>
+          </a:fontRef>
+        </p:style>
+      </p:cxnSp>
     </p:spTree>
     <p:extLst>
       <p:ext uri="{BB962C8B-B14F-4D97-AF65-F5344CB8AC3E}">
@@ -5054,7 +5110,7 @@
           <p:cNvPr id="18" name="Oval 19">
             <a:extLst>
               <a:ext uri="{FF2B5EF4-FFF2-40B4-BE49-F238E27FC236}">
-                <a16:creationId xmlns:a16="http://schemas.microsoft.com/office/drawing/2014/main" xmlns="" id="{1074244C-1DD6-4F23-BD1E-49DB0CB034EE}"/>
+                <a16:creationId xmlns="" xmlns:a16="http://schemas.microsoft.com/office/drawing/2014/main" id="{1074244C-1DD6-4F23-BD1E-49DB0CB034EE}"/>
               </a:ext>
             </a:extLst>
           </p:cNvPr>
@@ -5136,7 +5192,7 @@
           <p:cNvPr id="36" name="Rectangle 10">
             <a:extLst>
               <a:ext uri="{FF2B5EF4-FFF2-40B4-BE49-F238E27FC236}">
-                <a16:creationId xmlns:a16="http://schemas.microsoft.com/office/drawing/2014/main" xmlns="" id="{EEDE0868-CF1D-4890-AC3C-6582F292F01D}"/>
+                <a16:creationId xmlns="" xmlns:a16="http://schemas.microsoft.com/office/drawing/2014/main" id="{EEDE0868-CF1D-4890-AC3C-6582F292F01D}"/>
               </a:ext>
             </a:extLst>
           </p:cNvPr>
@@ -5218,7 +5274,7 @@
           <p:cNvPr id="37" name="Rectangle 10">
             <a:extLst>
               <a:ext uri="{FF2B5EF4-FFF2-40B4-BE49-F238E27FC236}">
-                <a16:creationId xmlns:a16="http://schemas.microsoft.com/office/drawing/2014/main" xmlns="" id="{EEDE0868-CF1D-4890-AC3C-6582F292F01D}"/>
+                <a16:creationId xmlns="" xmlns:a16="http://schemas.microsoft.com/office/drawing/2014/main" id="{EEDE0868-CF1D-4890-AC3C-6582F292F01D}"/>
               </a:ext>
             </a:extLst>
           </p:cNvPr>
@@ -5300,7 +5356,7 @@
           <p:cNvPr id="38" name="Rectangle 10">
             <a:extLst>
               <a:ext uri="{FF2B5EF4-FFF2-40B4-BE49-F238E27FC236}">
-                <a16:creationId xmlns:a16="http://schemas.microsoft.com/office/drawing/2014/main" xmlns="" id="{EEDE0868-CF1D-4890-AC3C-6582F292F01D}"/>
+                <a16:creationId xmlns="" xmlns:a16="http://schemas.microsoft.com/office/drawing/2014/main" id="{EEDE0868-CF1D-4890-AC3C-6582F292F01D}"/>
               </a:ext>
             </a:extLst>
           </p:cNvPr>
@@ -5382,7 +5438,7 @@
           <p:cNvPr id="39" name="Rectangle 10">
             <a:extLst>
               <a:ext uri="{FF2B5EF4-FFF2-40B4-BE49-F238E27FC236}">
-                <a16:creationId xmlns:a16="http://schemas.microsoft.com/office/drawing/2014/main" xmlns="" id="{EEDE0868-CF1D-4890-AC3C-6582F292F01D}"/>
+                <a16:creationId xmlns="" xmlns:a16="http://schemas.microsoft.com/office/drawing/2014/main" id="{EEDE0868-CF1D-4890-AC3C-6582F292F01D}"/>
               </a:ext>
             </a:extLst>
           </p:cNvPr>
@@ -5464,7 +5520,7 @@
           <p:cNvPr id="40" name="Rectangle 10">
             <a:extLst>
               <a:ext uri="{FF2B5EF4-FFF2-40B4-BE49-F238E27FC236}">
-                <a16:creationId xmlns:a16="http://schemas.microsoft.com/office/drawing/2014/main" xmlns="" id="{EEDE0868-CF1D-4890-AC3C-6582F292F01D}"/>
+                <a16:creationId xmlns="" xmlns:a16="http://schemas.microsoft.com/office/drawing/2014/main" id="{EEDE0868-CF1D-4890-AC3C-6582F292F01D}"/>
               </a:ext>
             </a:extLst>
           </p:cNvPr>
@@ -5546,7 +5602,7 @@
           <p:cNvPr id="44" name="Oval 19">
             <a:extLst>
               <a:ext uri="{FF2B5EF4-FFF2-40B4-BE49-F238E27FC236}">
-                <a16:creationId xmlns:a16="http://schemas.microsoft.com/office/drawing/2014/main" xmlns="" id="{1074244C-1DD6-4F23-BD1E-49DB0CB034EE}"/>
+                <a16:creationId xmlns="" xmlns:a16="http://schemas.microsoft.com/office/drawing/2014/main" id="{1074244C-1DD6-4F23-BD1E-49DB0CB034EE}"/>
               </a:ext>
             </a:extLst>
           </p:cNvPr>
@@ -5623,7 +5679,7 @@
           <p:cNvPr id="45" name="Rectangle 10">
             <a:extLst>
               <a:ext uri="{FF2B5EF4-FFF2-40B4-BE49-F238E27FC236}">
-                <a16:creationId xmlns:a16="http://schemas.microsoft.com/office/drawing/2014/main" xmlns="" id="{EEDE0868-CF1D-4890-AC3C-6582F292F01D}"/>
+                <a16:creationId xmlns="" xmlns:a16="http://schemas.microsoft.com/office/drawing/2014/main" id="{EEDE0868-CF1D-4890-AC3C-6582F292F01D}"/>
               </a:ext>
             </a:extLst>
           </p:cNvPr>
@@ -5705,7 +5761,7 @@
           <p:cNvPr id="48" name="Rectangle 10">
             <a:extLst>
               <a:ext uri="{FF2B5EF4-FFF2-40B4-BE49-F238E27FC236}">
-                <a16:creationId xmlns:a16="http://schemas.microsoft.com/office/drawing/2014/main" xmlns="" id="{EEDE0868-CF1D-4890-AC3C-6582F292F01D}"/>
+                <a16:creationId xmlns="" xmlns:a16="http://schemas.microsoft.com/office/drawing/2014/main" id="{EEDE0868-CF1D-4890-AC3C-6582F292F01D}"/>
               </a:ext>
             </a:extLst>
           </p:cNvPr>
@@ -5787,7 +5843,7 @@
           <p:cNvPr id="49" name="Oval 19">
             <a:extLst>
               <a:ext uri="{FF2B5EF4-FFF2-40B4-BE49-F238E27FC236}">
-                <a16:creationId xmlns:a16="http://schemas.microsoft.com/office/drawing/2014/main" xmlns="" id="{1074244C-1DD6-4F23-BD1E-49DB0CB034EE}"/>
+                <a16:creationId xmlns="" xmlns:a16="http://schemas.microsoft.com/office/drawing/2014/main" id="{1074244C-1DD6-4F23-BD1E-49DB0CB034EE}"/>
               </a:ext>
             </a:extLst>
           </p:cNvPr>
@@ -5869,7 +5925,7 @@
           <p:cNvPr id="50" name="Oval 19">
             <a:extLst>
               <a:ext uri="{FF2B5EF4-FFF2-40B4-BE49-F238E27FC236}">
-                <a16:creationId xmlns:a16="http://schemas.microsoft.com/office/drawing/2014/main" xmlns="" id="{1074244C-1DD6-4F23-BD1E-49DB0CB034EE}"/>
+                <a16:creationId xmlns="" xmlns:a16="http://schemas.microsoft.com/office/drawing/2014/main" id="{1074244C-1DD6-4F23-BD1E-49DB0CB034EE}"/>
               </a:ext>
             </a:extLst>
           </p:cNvPr>
@@ -5951,7 +6007,7 @@
           <p:cNvPr id="51" name="Oval 19">
             <a:extLst>
               <a:ext uri="{FF2B5EF4-FFF2-40B4-BE49-F238E27FC236}">
-                <a16:creationId xmlns:a16="http://schemas.microsoft.com/office/drawing/2014/main" xmlns="" id="{1074244C-1DD6-4F23-BD1E-49DB0CB034EE}"/>
+                <a16:creationId xmlns="" xmlns:a16="http://schemas.microsoft.com/office/drawing/2014/main" id="{1074244C-1DD6-4F23-BD1E-49DB0CB034EE}"/>
               </a:ext>
             </a:extLst>
           </p:cNvPr>
@@ -6162,7 +6218,7 @@
           <p:cNvPr id="61" name="Rectangle 10">
             <a:extLst>
               <a:ext uri="{FF2B5EF4-FFF2-40B4-BE49-F238E27FC236}">
-                <a16:creationId xmlns:a16="http://schemas.microsoft.com/office/drawing/2014/main" xmlns="" id="{EEDE0868-CF1D-4890-AC3C-6582F292F01D}"/>
+                <a16:creationId xmlns="" xmlns:a16="http://schemas.microsoft.com/office/drawing/2014/main" id="{EEDE0868-CF1D-4890-AC3C-6582F292F01D}"/>
               </a:ext>
             </a:extLst>
           </p:cNvPr>
@@ -7765,7 +7821,7 @@
   <a:extraClrSchemeLst/>
   <a:extLst>
     <a:ext uri="{05A4C25C-085E-4340-85A3-A5531E510DB2}">
-      <thm15:themeFamily xmlns:thm15="http://schemas.microsoft.com/office/thememl/2012/main" xmlns="" name="Office Theme" id="{62F939B6-93AF-4DB8-9C6B-D6C7DFDC589F}" vid="{4A3C46E8-61CC-4603-A589-7422A47A8E4A}"/>
+      <thm15:themeFamily xmlns="" xmlns:thm15="http://schemas.microsoft.com/office/thememl/2012/main" name="Office Theme" id="{62F939B6-93AF-4DB8-9C6B-D6C7DFDC589F}" vid="{4A3C46E8-61CC-4603-A589-7422A47A8E4A}"/>
     </a:ext>
   </a:extLst>
 </a:theme>

</xml_diff>